<commit_message>
update of sql folder and creation of special characters folders
</commit_message>
<xml_diff>
--- a/SQL_NoSQL/SQL_tips.pptx
+++ b/SQL_NoSQL/SQL_tips.pptx
@@ -8,6 +8,7 @@
     <p:sldId id="256" r:id="rId2"/>
     <p:sldId id="257" r:id="rId3"/>
     <p:sldId id="258" r:id="rId4"/>
+    <p:sldId id="259" r:id="rId5"/>
   </p:sldIdLst>
   <p:sldSz cx="12192000" cy="6858000"/>
   <p:notesSz cx="6858000" cy="9144000"/>
@@ -124,7 +125,15 @@
             <p14:sldId id="258"/>
           </p14:sldIdLst>
         </p14:section>
+        <p14:section name="Column names" id="{36BC6532-04E2-4FCE-98A4-8840D5282DD4}">
+          <p14:sldIdLst>
+            <p14:sldId id="259"/>
+          </p14:sldIdLst>
+        </p14:section>
       </p14:sectionLst>
+    </p:ext>
+    <p:ext uri="{EFAFB233-063F-42B5-8137-9DF3F51BA10A}">
+      <p15:sldGuideLst xmlns:p15="http://schemas.microsoft.com/office/powerpoint/2012/main"/>
     </p:ext>
   </p:extLst>
 </p:presentation>
@@ -277,7 +286,7 @@
           <a:p>
             <a:fld id="{29298C0B-63E3-4CA1-8537-365FAE5A9007}" type="datetimeFigureOut">
               <a:rPr lang="en-US" smtClean="0"/>
-              <a:t>22-Oct-21</a:t>
+              <a:t>06-Apr-22</a:t>
             </a:fld>
             <a:endParaRPr lang="en-US"/>
           </a:p>
@@ -475,7 +484,7 @@
           <a:p>
             <a:fld id="{29298C0B-63E3-4CA1-8537-365FAE5A9007}" type="datetimeFigureOut">
               <a:rPr lang="en-US" smtClean="0"/>
-              <a:t>22-Oct-21</a:t>
+              <a:t>06-Apr-22</a:t>
             </a:fld>
             <a:endParaRPr lang="en-US"/>
           </a:p>
@@ -683,7 +692,7 @@
           <a:p>
             <a:fld id="{29298C0B-63E3-4CA1-8537-365FAE5A9007}" type="datetimeFigureOut">
               <a:rPr lang="en-US" smtClean="0"/>
-              <a:t>22-Oct-21</a:t>
+              <a:t>06-Apr-22</a:t>
             </a:fld>
             <a:endParaRPr lang="en-US"/>
           </a:p>
@@ -881,7 +890,7 @@
           <a:p>
             <a:fld id="{29298C0B-63E3-4CA1-8537-365FAE5A9007}" type="datetimeFigureOut">
               <a:rPr lang="en-US" smtClean="0"/>
-              <a:t>22-Oct-21</a:t>
+              <a:t>06-Apr-22</a:t>
             </a:fld>
             <a:endParaRPr lang="en-US"/>
           </a:p>
@@ -1156,7 +1165,7 @@
           <a:p>
             <a:fld id="{29298C0B-63E3-4CA1-8537-365FAE5A9007}" type="datetimeFigureOut">
               <a:rPr lang="en-US" smtClean="0"/>
-              <a:t>22-Oct-21</a:t>
+              <a:t>06-Apr-22</a:t>
             </a:fld>
             <a:endParaRPr lang="en-US"/>
           </a:p>
@@ -1421,7 +1430,7 @@
           <a:p>
             <a:fld id="{29298C0B-63E3-4CA1-8537-365FAE5A9007}" type="datetimeFigureOut">
               <a:rPr lang="en-US" smtClean="0"/>
-              <a:t>22-Oct-21</a:t>
+              <a:t>06-Apr-22</a:t>
             </a:fld>
             <a:endParaRPr lang="en-US"/>
           </a:p>
@@ -1833,7 +1842,7 @@
           <a:p>
             <a:fld id="{29298C0B-63E3-4CA1-8537-365FAE5A9007}" type="datetimeFigureOut">
               <a:rPr lang="en-US" smtClean="0"/>
-              <a:t>22-Oct-21</a:t>
+              <a:t>06-Apr-22</a:t>
             </a:fld>
             <a:endParaRPr lang="en-US"/>
           </a:p>
@@ -1974,7 +1983,7 @@
           <a:p>
             <a:fld id="{29298C0B-63E3-4CA1-8537-365FAE5A9007}" type="datetimeFigureOut">
               <a:rPr lang="en-US" smtClean="0"/>
-              <a:t>22-Oct-21</a:t>
+              <a:t>06-Apr-22</a:t>
             </a:fld>
             <a:endParaRPr lang="en-US"/>
           </a:p>
@@ -2087,7 +2096,7 @@
           <a:p>
             <a:fld id="{29298C0B-63E3-4CA1-8537-365FAE5A9007}" type="datetimeFigureOut">
               <a:rPr lang="en-US" smtClean="0"/>
-              <a:t>22-Oct-21</a:t>
+              <a:t>06-Apr-22</a:t>
             </a:fld>
             <a:endParaRPr lang="en-US"/>
           </a:p>
@@ -2398,7 +2407,7 @@
           <a:p>
             <a:fld id="{29298C0B-63E3-4CA1-8537-365FAE5A9007}" type="datetimeFigureOut">
               <a:rPr lang="en-US" smtClean="0"/>
-              <a:t>22-Oct-21</a:t>
+              <a:t>06-Apr-22</a:t>
             </a:fld>
             <a:endParaRPr lang="en-US"/>
           </a:p>
@@ -2686,7 +2695,7 @@
           <a:p>
             <a:fld id="{29298C0B-63E3-4CA1-8537-365FAE5A9007}" type="datetimeFigureOut">
               <a:rPr lang="en-US" smtClean="0"/>
-              <a:t>22-Oct-21</a:t>
+              <a:t>06-Apr-22</a:t>
             </a:fld>
             <a:endParaRPr lang="en-US"/>
           </a:p>
@@ -2927,7 +2936,7 @@
           <a:p>
             <a:fld id="{29298C0B-63E3-4CA1-8537-365FAE5A9007}" type="datetimeFigureOut">
               <a:rPr lang="en-US" smtClean="0"/>
-              <a:t>22-Oct-21</a:t>
+              <a:t>06-Apr-22</a:t>
             </a:fld>
             <a:endParaRPr lang="en-US"/>
           </a:p>
@@ -3728,6 +3737,110 @@
 </p:sld>
 </file>
 
+<file path=ppt/slides/slide4.xml><?xml version="1.0" encoding="utf-8"?>
+<p:sld xmlns:a="http://schemas.openxmlformats.org/drawingml/2006/main" xmlns:r="http://schemas.openxmlformats.org/officeDocument/2006/relationships" xmlns:p="http://schemas.openxmlformats.org/presentationml/2006/main">
+  <p:cSld>
+    <p:spTree>
+      <p:nvGrpSpPr>
+        <p:cNvPr id="1" name=""/>
+        <p:cNvGrpSpPr/>
+        <p:nvPr/>
+      </p:nvGrpSpPr>
+      <p:grpSpPr>
+        <a:xfrm>
+          <a:off x="0" y="0"/>
+          <a:ext cx="0" cy="0"/>
+          <a:chOff x="0" y="0"/>
+          <a:chExt cx="0" cy="0"/>
+        </a:xfrm>
+      </p:grpSpPr>
+      <p:sp>
+        <p:nvSpPr>
+          <p:cNvPr id="2" name="Title 1">
+            <a:extLst>
+              <a:ext uri="{FF2B5EF4-FFF2-40B4-BE49-F238E27FC236}">
+                <a16:creationId xmlns:a16="http://schemas.microsoft.com/office/drawing/2014/main" id="{3A0445A2-391C-4F9C-B077-BAA8217AA8B5}"/>
+              </a:ext>
+            </a:extLst>
+          </p:cNvPr>
+          <p:cNvSpPr>
+            <a:spLocks noGrp="1"/>
+          </p:cNvSpPr>
+          <p:nvPr>
+            <p:ph type="title"/>
+          </p:nvPr>
+        </p:nvSpPr>
+        <p:spPr/>
+        <p:txBody>
+          <a:bodyPr/>
+          <a:lstStyle/>
+          <a:p>
+            <a:r>
+              <a:rPr lang="fr-FR" dirty="0" err="1"/>
+              <a:t>Filter</a:t>
+            </a:r>
+            <a:r>
+              <a:rPr lang="fr-FR" dirty="0"/>
+              <a:t> on </a:t>
+            </a:r>
+            <a:r>
+              <a:rPr lang="fr-FR" dirty="0" err="1"/>
+              <a:t>column</a:t>
+            </a:r>
+            <a:r>
+              <a:rPr lang="fr-FR" dirty="0"/>
+              <a:t> </a:t>
+            </a:r>
+            <a:r>
+              <a:rPr lang="fr-FR" dirty="0" err="1"/>
+              <a:t>names</a:t>
+            </a:r>
+            <a:endParaRPr lang="en-US" dirty="0"/>
+          </a:p>
+        </p:txBody>
+      </p:sp>
+      <p:pic>
+        <p:nvPicPr>
+          <p:cNvPr id="5" name="Content Placeholder 4">
+            <a:extLst>
+              <a:ext uri="{FF2B5EF4-FFF2-40B4-BE49-F238E27FC236}">
+                <a16:creationId xmlns:a16="http://schemas.microsoft.com/office/drawing/2014/main" id="{ED50A625-B481-488A-9C4F-46C42F2AA4DD}"/>
+              </a:ext>
+            </a:extLst>
+          </p:cNvPr>
+          <p:cNvPicPr>
+            <a:picLocks noGrp="1" noChangeAspect="1"/>
+          </p:cNvPicPr>
+          <p:nvPr>
+            <p:ph idx="1"/>
+          </p:nvPr>
+        </p:nvPicPr>
+        <p:blipFill>
+          <a:blip r:embed="rId2"/>
+          <a:stretch>
+            <a:fillRect/>
+          </a:stretch>
+        </p:blipFill>
+        <p:spPr>
+          <a:xfrm>
+            <a:off x="4629150" y="3544094"/>
+            <a:ext cx="2933700" cy="914400"/>
+          </a:xfrm>
+        </p:spPr>
+      </p:pic>
+    </p:spTree>
+    <p:extLst>
+      <p:ext uri="{BB962C8B-B14F-4D97-AF65-F5344CB8AC3E}">
+        <p14:creationId xmlns:p14="http://schemas.microsoft.com/office/powerpoint/2010/main" val="3049128863"/>
+      </p:ext>
+    </p:extLst>
+  </p:cSld>
+  <p:clrMapOvr>
+    <a:masterClrMapping/>
+  </p:clrMapOvr>
+</p:sld>
+</file>
+
 <file path=ppt/theme/theme1.xml><?xml version="1.0" encoding="utf-8"?>
 <a:theme xmlns:a="http://schemas.openxmlformats.org/drawingml/2006/main" name="Office Theme">
   <a:themeElements>

</xml_diff>

<commit_message>
update of the branch
</commit_message>
<xml_diff>
--- a/SQL_NoSQL/SQL_tips.pptx
+++ b/SQL_NoSQL/SQL_tips.pptx
@@ -286,7 +286,7 @@
           <a:p>
             <a:fld id="{29298C0B-63E3-4CA1-8537-365FAE5A9007}" type="datetimeFigureOut">
               <a:rPr lang="en-US" smtClean="0"/>
-              <a:t>06-Apr-22</a:t>
+              <a:t>08-Aug-22</a:t>
             </a:fld>
             <a:endParaRPr lang="en-US"/>
           </a:p>
@@ -484,7 +484,7 @@
           <a:p>
             <a:fld id="{29298C0B-63E3-4CA1-8537-365FAE5A9007}" type="datetimeFigureOut">
               <a:rPr lang="en-US" smtClean="0"/>
-              <a:t>06-Apr-22</a:t>
+              <a:t>08-Aug-22</a:t>
             </a:fld>
             <a:endParaRPr lang="en-US"/>
           </a:p>
@@ -692,7 +692,7 @@
           <a:p>
             <a:fld id="{29298C0B-63E3-4CA1-8537-365FAE5A9007}" type="datetimeFigureOut">
               <a:rPr lang="en-US" smtClean="0"/>
-              <a:t>06-Apr-22</a:t>
+              <a:t>08-Aug-22</a:t>
             </a:fld>
             <a:endParaRPr lang="en-US"/>
           </a:p>
@@ -890,7 +890,7 @@
           <a:p>
             <a:fld id="{29298C0B-63E3-4CA1-8537-365FAE5A9007}" type="datetimeFigureOut">
               <a:rPr lang="en-US" smtClean="0"/>
-              <a:t>06-Apr-22</a:t>
+              <a:t>08-Aug-22</a:t>
             </a:fld>
             <a:endParaRPr lang="en-US"/>
           </a:p>
@@ -1165,7 +1165,7 @@
           <a:p>
             <a:fld id="{29298C0B-63E3-4CA1-8537-365FAE5A9007}" type="datetimeFigureOut">
               <a:rPr lang="en-US" smtClean="0"/>
-              <a:t>06-Apr-22</a:t>
+              <a:t>08-Aug-22</a:t>
             </a:fld>
             <a:endParaRPr lang="en-US"/>
           </a:p>
@@ -1430,7 +1430,7 @@
           <a:p>
             <a:fld id="{29298C0B-63E3-4CA1-8537-365FAE5A9007}" type="datetimeFigureOut">
               <a:rPr lang="en-US" smtClean="0"/>
-              <a:t>06-Apr-22</a:t>
+              <a:t>08-Aug-22</a:t>
             </a:fld>
             <a:endParaRPr lang="en-US"/>
           </a:p>
@@ -1842,7 +1842,7 @@
           <a:p>
             <a:fld id="{29298C0B-63E3-4CA1-8537-365FAE5A9007}" type="datetimeFigureOut">
               <a:rPr lang="en-US" smtClean="0"/>
-              <a:t>06-Apr-22</a:t>
+              <a:t>08-Aug-22</a:t>
             </a:fld>
             <a:endParaRPr lang="en-US"/>
           </a:p>
@@ -1983,7 +1983,7 @@
           <a:p>
             <a:fld id="{29298C0B-63E3-4CA1-8537-365FAE5A9007}" type="datetimeFigureOut">
               <a:rPr lang="en-US" smtClean="0"/>
-              <a:t>06-Apr-22</a:t>
+              <a:t>08-Aug-22</a:t>
             </a:fld>
             <a:endParaRPr lang="en-US"/>
           </a:p>
@@ -2096,7 +2096,7 @@
           <a:p>
             <a:fld id="{29298C0B-63E3-4CA1-8537-365FAE5A9007}" type="datetimeFigureOut">
               <a:rPr lang="en-US" smtClean="0"/>
-              <a:t>06-Apr-22</a:t>
+              <a:t>08-Aug-22</a:t>
             </a:fld>
             <a:endParaRPr lang="en-US"/>
           </a:p>
@@ -2407,7 +2407,7 @@
           <a:p>
             <a:fld id="{29298C0B-63E3-4CA1-8537-365FAE5A9007}" type="datetimeFigureOut">
               <a:rPr lang="en-US" smtClean="0"/>
-              <a:t>06-Apr-22</a:t>
+              <a:t>08-Aug-22</a:t>
             </a:fld>
             <a:endParaRPr lang="en-US"/>
           </a:p>
@@ -2695,7 +2695,7 @@
           <a:p>
             <a:fld id="{29298C0B-63E3-4CA1-8537-365FAE5A9007}" type="datetimeFigureOut">
               <a:rPr lang="en-US" smtClean="0"/>
-              <a:t>06-Apr-22</a:t>
+              <a:t>08-Aug-22</a:t>
             </a:fld>
             <a:endParaRPr lang="en-US"/>
           </a:p>
@@ -2936,7 +2936,7 @@
           <a:p>
             <a:fld id="{29298C0B-63E3-4CA1-8537-365FAE5A9007}" type="datetimeFigureOut">
               <a:rPr lang="en-US" smtClean="0"/>
-              <a:t>06-Apr-22</a:t>
+              <a:t>08-Aug-22</a:t>
             </a:fld>
             <a:endParaRPr lang="en-US"/>
           </a:p>
@@ -3823,8 +3823,8 @@
         </p:blipFill>
         <p:spPr>
           <a:xfrm>
-            <a:off x="4629150" y="3544094"/>
-            <a:ext cx="2933700" cy="914400"/>
+            <a:off x="2614260" y="2500485"/>
+            <a:ext cx="6677998" cy="2081454"/>
           </a:xfrm>
         </p:spPr>
       </p:pic>

</xml_diff>

<commit_message>
Update of bash commands and NoSQL
</commit_message>
<xml_diff>
--- a/SQL_NoSQL/SQL_tips.pptx
+++ b/SQL_NoSQL/SQL_tips.pptx
@@ -9,6 +9,7 @@
     <p:sldId id="257" r:id="rId3"/>
     <p:sldId id="258" r:id="rId4"/>
     <p:sldId id="259" r:id="rId5"/>
+    <p:sldId id="260" r:id="rId6"/>
   </p:sldIdLst>
   <p:sldSz cx="12192000" cy="6858000"/>
   <p:notesSz cx="6858000" cy="9144000"/>
@@ -128,6 +129,7 @@
         <p14:section name="Column names" id="{36BC6532-04E2-4FCE-98A4-8840D5282DD4}">
           <p14:sldIdLst>
             <p14:sldId id="259"/>
+            <p14:sldId id="260"/>
           </p14:sldIdLst>
         </p14:section>
       </p14:sectionLst>
@@ -286,7 +288,7 @@
           <a:p>
             <a:fld id="{29298C0B-63E3-4CA1-8537-365FAE5A9007}" type="datetimeFigureOut">
               <a:rPr lang="en-US" smtClean="0"/>
-              <a:t>08-Aug-22</a:t>
+              <a:t>22-Sep-22</a:t>
             </a:fld>
             <a:endParaRPr lang="en-US"/>
           </a:p>
@@ -484,7 +486,7 @@
           <a:p>
             <a:fld id="{29298C0B-63E3-4CA1-8537-365FAE5A9007}" type="datetimeFigureOut">
               <a:rPr lang="en-US" smtClean="0"/>
-              <a:t>08-Aug-22</a:t>
+              <a:t>22-Sep-22</a:t>
             </a:fld>
             <a:endParaRPr lang="en-US"/>
           </a:p>
@@ -692,7 +694,7 @@
           <a:p>
             <a:fld id="{29298C0B-63E3-4CA1-8537-365FAE5A9007}" type="datetimeFigureOut">
               <a:rPr lang="en-US" smtClean="0"/>
-              <a:t>08-Aug-22</a:t>
+              <a:t>22-Sep-22</a:t>
             </a:fld>
             <a:endParaRPr lang="en-US"/>
           </a:p>
@@ -890,7 +892,7 @@
           <a:p>
             <a:fld id="{29298C0B-63E3-4CA1-8537-365FAE5A9007}" type="datetimeFigureOut">
               <a:rPr lang="en-US" smtClean="0"/>
-              <a:t>08-Aug-22</a:t>
+              <a:t>22-Sep-22</a:t>
             </a:fld>
             <a:endParaRPr lang="en-US"/>
           </a:p>
@@ -1165,7 +1167,7 @@
           <a:p>
             <a:fld id="{29298C0B-63E3-4CA1-8537-365FAE5A9007}" type="datetimeFigureOut">
               <a:rPr lang="en-US" smtClean="0"/>
-              <a:t>08-Aug-22</a:t>
+              <a:t>22-Sep-22</a:t>
             </a:fld>
             <a:endParaRPr lang="en-US"/>
           </a:p>
@@ -1430,7 +1432,7 @@
           <a:p>
             <a:fld id="{29298C0B-63E3-4CA1-8537-365FAE5A9007}" type="datetimeFigureOut">
               <a:rPr lang="en-US" smtClean="0"/>
-              <a:t>08-Aug-22</a:t>
+              <a:t>22-Sep-22</a:t>
             </a:fld>
             <a:endParaRPr lang="en-US"/>
           </a:p>
@@ -1842,7 +1844,7 @@
           <a:p>
             <a:fld id="{29298C0B-63E3-4CA1-8537-365FAE5A9007}" type="datetimeFigureOut">
               <a:rPr lang="en-US" smtClean="0"/>
-              <a:t>08-Aug-22</a:t>
+              <a:t>22-Sep-22</a:t>
             </a:fld>
             <a:endParaRPr lang="en-US"/>
           </a:p>
@@ -1983,7 +1985,7 @@
           <a:p>
             <a:fld id="{29298C0B-63E3-4CA1-8537-365FAE5A9007}" type="datetimeFigureOut">
               <a:rPr lang="en-US" smtClean="0"/>
-              <a:t>08-Aug-22</a:t>
+              <a:t>22-Sep-22</a:t>
             </a:fld>
             <a:endParaRPr lang="en-US"/>
           </a:p>
@@ -2096,7 +2098,7 @@
           <a:p>
             <a:fld id="{29298C0B-63E3-4CA1-8537-365FAE5A9007}" type="datetimeFigureOut">
               <a:rPr lang="en-US" smtClean="0"/>
-              <a:t>08-Aug-22</a:t>
+              <a:t>22-Sep-22</a:t>
             </a:fld>
             <a:endParaRPr lang="en-US"/>
           </a:p>
@@ -2407,7 +2409,7 @@
           <a:p>
             <a:fld id="{29298C0B-63E3-4CA1-8537-365FAE5A9007}" type="datetimeFigureOut">
               <a:rPr lang="en-US" smtClean="0"/>
-              <a:t>08-Aug-22</a:t>
+              <a:t>22-Sep-22</a:t>
             </a:fld>
             <a:endParaRPr lang="en-US"/>
           </a:p>
@@ -2695,7 +2697,7 @@
           <a:p>
             <a:fld id="{29298C0B-63E3-4CA1-8537-365FAE5A9007}" type="datetimeFigureOut">
               <a:rPr lang="en-US" smtClean="0"/>
-              <a:t>08-Aug-22</a:t>
+              <a:t>22-Sep-22</a:t>
             </a:fld>
             <a:endParaRPr lang="en-US"/>
           </a:p>
@@ -2936,7 +2938,7 @@
           <a:p>
             <a:fld id="{29298C0B-63E3-4CA1-8537-365FAE5A9007}" type="datetimeFigureOut">
               <a:rPr lang="en-US" smtClean="0"/>
-              <a:t>08-Aug-22</a:t>
+              <a:t>22-Sep-22</a:t>
             </a:fld>
             <a:endParaRPr lang="en-US"/>
           </a:p>
@@ -3841,6 +3843,112 @@
 </p:sld>
 </file>
 
+<file path=ppt/slides/slide5.xml><?xml version="1.0" encoding="utf-8"?>
+<p:sld xmlns:a="http://schemas.openxmlformats.org/drawingml/2006/main" xmlns:r="http://schemas.openxmlformats.org/officeDocument/2006/relationships" xmlns:p="http://schemas.openxmlformats.org/presentationml/2006/main">
+  <p:cSld>
+    <p:spTree>
+      <p:nvGrpSpPr>
+        <p:cNvPr id="1" name=""/>
+        <p:cNvGrpSpPr/>
+        <p:nvPr/>
+      </p:nvGrpSpPr>
+      <p:grpSpPr>
+        <a:xfrm>
+          <a:off x="0" y="0"/>
+          <a:ext cx="0" cy="0"/>
+          <a:chOff x="0" y="0"/>
+          <a:chExt cx="0" cy="0"/>
+        </a:xfrm>
+      </p:grpSpPr>
+      <p:sp>
+        <p:nvSpPr>
+          <p:cNvPr id="2" name="Title 1">
+            <a:extLst>
+              <a:ext uri="{FF2B5EF4-FFF2-40B4-BE49-F238E27FC236}">
+                <a16:creationId xmlns:a16="http://schemas.microsoft.com/office/drawing/2014/main" id="{8A708691-9A11-444F-9D11-BD9F2229214A}"/>
+              </a:ext>
+            </a:extLst>
+          </p:cNvPr>
+          <p:cNvSpPr>
+            <a:spLocks noGrp="1"/>
+          </p:cNvSpPr>
+          <p:nvPr>
+            <p:ph type="title"/>
+          </p:nvPr>
+        </p:nvSpPr>
+        <p:spPr/>
+        <p:txBody>
+          <a:bodyPr/>
+          <a:lstStyle/>
+          <a:p>
+            <a:r>
+              <a:rPr lang="fr-FR" dirty="0"/>
+              <a:t>Drop </a:t>
+            </a:r>
+            <a:r>
+              <a:rPr lang="fr-FR" dirty="0" err="1"/>
+              <a:t>rows</a:t>
+            </a:r>
+            <a:endParaRPr lang="en-US" dirty="0"/>
+          </a:p>
+        </p:txBody>
+      </p:sp>
+      <p:sp>
+        <p:nvSpPr>
+          <p:cNvPr id="3" name="Content Placeholder 2">
+            <a:extLst>
+              <a:ext uri="{FF2B5EF4-FFF2-40B4-BE49-F238E27FC236}">
+                <a16:creationId xmlns:a16="http://schemas.microsoft.com/office/drawing/2014/main" id="{C8FCF587-7ECC-47A9-BD59-23E3C66FC6CB}"/>
+              </a:ext>
+            </a:extLst>
+          </p:cNvPr>
+          <p:cNvSpPr>
+            <a:spLocks noGrp="1"/>
+          </p:cNvSpPr>
+          <p:nvPr>
+            <p:ph idx="1"/>
+          </p:nvPr>
+        </p:nvSpPr>
+        <p:spPr/>
+        <p:txBody>
+          <a:bodyPr/>
+          <a:lstStyle/>
+          <a:p>
+            <a:r>
+              <a:rPr lang="fr-FR" dirty="0"/>
+              <a:t>DELETE FROM </a:t>
+            </a:r>
+            <a:r>
+              <a:rPr lang="fr-FR" i="1" dirty="0"/>
+              <a:t>table</a:t>
+            </a:r>
+          </a:p>
+          <a:p>
+            <a:r>
+              <a:rPr lang="fr-FR" dirty="0"/>
+              <a:t>WHERE </a:t>
+            </a:r>
+            <a:r>
+              <a:rPr lang="fr-FR" i="1" dirty="0"/>
+              <a:t>condition</a:t>
+            </a:r>
+            <a:endParaRPr lang="en-US" i="1" dirty="0"/>
+          </a:p>
+        </p:txBody>
+      </p:sp>
+    </p:spTree>
+    <p:extLst>
+      <p:ext uri="{BB962C8B-B14F-4D97-AF65-F5344CB8AC3E}">
+        <p14:creationId xmlns:p14="http://schemas.microsoft.com/office/powerpoint/2010/main" val="2963149485"/>
+      </p:ext>
+    </p:extLst>
+  </p:cSld>
+  <p:clrMapOvr>
+    <a:masterClrMapping/>
+  </p:clrMapOvr>
+</p:sld>
+</file>
+
 <file path=ppt/theme/theme1.xml><?xml version="1.0" encoding="utf-8"?>
 <a:theme xmlns:a="http://schemas.openxmlformats.org/drawingml/2006/main" name="Office Theme">
   <a:themeElements>

</xml_diff>